<commit_message>
Altera imagens da especificação
</commit_message>
<xml_diff>
--- a/espec011_valor_pago/static/textodascolunas.pptx
+++ b/espec011_valor_pago/static/textodascolunas.pptx
@@ -109,6 +109,11 @@
       </a:defRPr>
     </a:lvl9pPr>
   </p:defaultTextStyle>
+  <p:extLst>
+    <p:ext uri="{EFAFB233-063F-42B5-8137-9DF3F51BA10A}">
+      <p15:sldGuideLst xmlns:p15="http://schemas.microsoft.com/office/powerpoint/2012/main"/>
+    </p:ext>
+  </p:extLst>
 </p:presentation>
 </file>
 
@@ -243,7 +248,7 @@
           <a:p>
             <a:fld id="{C9A3F4E2-4ED7-44CE-A122-66F4390D6D57}" type="datetimeFigureOut">
               <a:rPr lang="pt-BR" smtClean="0"/>
-              <a:t>20/12/2019</a:t>
+              <a:t>13/01/2020</a:t>
             </a:fld>
             <a:endParaRPr lang="pt-BR"/>
           </a:p>
@@ -413,7 +418,7 @@
           <a:p>
             <a:fld id="{C9A3F4E2-4ED7-44CE-A122-66F4390D6D57}" type="datetimeFigureOut">
               <a:rPr lang="pt-BR" smtClean="0"/>
-              <a:t>20/12/2019</a:t>
+              <a:t>13/01/2020</a:t>
             </a:fld>
             <a:endParaRPr lang="pt-BR"/>
           </a:p>
@@ -593,7 +598,7 @@
           <a:p>
             <a:fld id="{C9A3F4E2-4ED7-44CE-A122-66F4390D6D57}" type="datetimeFigureOut">
               <a:rPr lang="pt-BR" smtClean="0"/>
-              <a:t>20/12/2019</a:t>
+              <a:t>13/01/2020</a:t>
             </a:fld>
             <a:endParaRPr lang="pt-BR"/>
           </a:p>
@@ -763,7 +768,7 @@
           <a:p>
             <a:fld id="{C9A3F4E2-4ED7-44CE-A122-66F4390D6D57}" type="datetimeFigureOut">
               <a:rPr lang="pt-BR" smtClean="0"/>
-              <a:t>20/12/2019</a:t>
+              <a:t>13/01/2020</a:t>
             </a:fld>
             <a:endParaRPr lang="pt-BR"/>
           </a:p>
@@ -1009,7 +1014,7 @@
           <a:p>
             <a:fld id="{C9A3F4E2-4ED7-44CE-A122-66F4390D6D57}" type="datetimeFigureOut">
               <a:rPr lang="pt-BR" smtClean="0"/>
-              <a:t>20/12/2019</a:t>
+              <a:t>13/01/2020</a:t>
             </a:fld>
             <a:endParaRPr lang="pt-BR"/>
           </a:p>
@@ -1241,7 +1246,7 @@
           <a:p>
             <a:fld id="{C9A3F4E2-4ED7-44CE-A122-66F4390D6D57}" type="datetimeFigureOut">
               <a:rPr lang="pt-BR" smtClean="0"/>
-              <a:t>20/12/2019</a:t>
+              <a:t>13/01/2020</a:t>
             </a:fld>
             <a:endParaRPr lang="pt-BR"/>
           </a:p>
@@ -1608,7 +1613,7 @@
           <a:p>
             <a:fld id="{C9A3F4E2-4ED7-44CE-A122-66F4390D6D57}" type="datetimeFigureOut">
               <a:rPr lang="pt-BR" smtClean="0"/>
-              <a:t>20/12/2019</a:t>
+              <a:t>13/01/2020</a:t>
             </a:fld>
             <a:endParaRPr lang="pt-BR"/>
           </a:p>
@@ -1726,7 +1731,7 @@
           <a:p>
             <a:fld id="{C9A3F4E2-4ED7-44CE-A122-66F4390D6D57}" type="datetimeFigureOut">
               <a:rPr lang="pt-BR" smtClean="0"/>
-              <a:t>20/12/2019</a:t>
+              <a:t>13/01/2020</a:t>
             </a:fld>
             <a:endParaRPr lang="pt-BR"/>
           </a:p>
@@ -1821,7 +1826,7 @@
           <a:p>
             <a:fld id="{C9A3F4E2-4ED7-44CE-A122-66F4390D6D57}" type="datetimeFigureOut">
               <a:rPr lang="pt-BR" smtClean="0"/>
-              <a:t>20/12/2019</a:t>
+              <a:t>13/01/2020</a:t>
             </a:fld>
             <a:endParaRPr lang="pt-BR"/>
           </a:p>
@@ -2098,7 +2103,7 @@
           <a:p>
             <a:fld id="{C9A3F4E2-4ED7-44CE-A122-66F4390D6D57}" type="datetimeFigureOut">
               <a:rPr lang="pt-BR" smtClean="0"/>
-              <a:t>20/12/2019</a:t>
+              <a:t>13/01/2020</a:t>
             </a:fld>
             <a:endParaRPr lang="pt-BR"/>
           </a:p>
@@ -2351,7 +2356,7 @@
           <a:p>
             <a:fld id="{C9A3F4E2-4ED7-44CE-A122-66F4390D6D57}" type="datetimeFigureOut">
               <a:rPr lang="pt-BR" smtClean="0"/>
-              <a:t>20/12/2019</a:t>
+              <a:t>13/01/2020</a:t>
             </a:fld>
             <a:endParaRPr lang="pt-BR"/>
           </a:p>
@@ -2564,7 +2569,7 @@
           <a:p>
             <a:fld id="{C9A3F4E2-4ED7-44CE-A122-66F4390D6D57}" type="datetimeFigureOut">
               <a:rPr lang="pt-BR" smtClean="0"/>
-              <a:t>20/12/2019</a:t>
+              <a:t>13/01/2020</a:t>
             </a:fld>
             <a:endParaRPr lang="pt-BR"/>
           </a:p>
@@ -3096,7 +3101,7 @@
         <p:spPr>
           <a:xfrm>
             <a:off x="720762" y="2699610"/>
-            <a:ext cx="1333949" cy="292388"/>
+            <a:ext cx="1495313" cy="292388"/>
           </a:xfrm>
           <a:prstGeom prst="rect">
             <a:avLst/>
@@ -3113,7 +3118,11 @@
           <a:p>
             <a:r>
               <a:rPr lang="pt-BR" sz="1300" b="1" dirty="0" smtClean="0"/>
-              <a:t>Data Registro</a:t>
+              <a:t>Data </a:t>
+            </a:r>
+            <a:r>
+              <a:rPr lang="pt-BR" sz="1300" b="1" dirty="0" smtClean="0"/>
+              <a:t>de Registro</a:t>
             </a:r>
             <a:endParaRPr lang="pt-BR" sz="1300" b="1" dirty="0"/>
           </a:p>
@@ -3128,7 +3137,7 @@
         <p:spPr>
           <a:xfrm>
             <a:off x="2443779" y="2699610"/>
-            <a:ext cx="1654885" cy="292388"/>
+            <a:ext cx="1794734" cy="292388"/>
           </a:xfrm>
           <a:prstGeom prst="rect">
             <a:avLst/>
@@ -3145,7 +3154,11 @@
           <a:p>
             <a:r>
               <a:rPr lang="pt-BR" sz="1300" b="1" dirty="0" smtClean="0"/>
-              <a:t>Número Empenho</a:t>
+              <a:t>Número </a:t>
+            </a:r>
+            <a:r>
+              <a:rPr lang="pt-BR" sz="1300" b="1" dirty="0" smtClean="0"/>
+              <a:t>do Empenho</a:t>
             </a:r>
             <a:endParaRPr lang="pt-BR" sz="1300" b="1" dirty="0"/>
           </a:p>
@@ -3167,7 +3180,7 @@
         </p:blipFill>
         <p:spPr>
           <a:xfrm>
-            <a:off x="3889114" y="2699610"/>
+            <a:off x="4160856" y="2699610"/>
             <a:ext cx="209550" cy="247650"/>
           </a:xfrm>
           <a:prstGeom prst="rect">
@@ -3191,7 +3204,7 @@
         </p:blipFill>
         <p:spPr>
           <a:xfrm>
-            <a:off x="1823646" y="2699610"/>
+            <a:off x="2015602" y="2714849"/>
             <a:ext cx="209550" cy="247650"/>
           </a:xfrm>
           <a:prstGeom prst="rect">
@@ -3325,7 +3338,11 @@
           <a:p>
             <a:r>
               <a:rPr lang="pt-BR" sz="1300" b="1" dirty="0" smtClean="0"/>
-              <a:t>Data Registro</a:t>
+              <a:t>Data </a:t>
+            </a:r>
+            <a:r>
+              <a:rPr lang="pt-BR" sz="1300" b="1" dirty="0" smtClean="0"/>
+              <a:t>de Registro</a:t>
             </a:r>
             <a:endParaRPr lang="pt-BR" sz="1300" b="1" dirty="0"/>
           </a:p>
@@ -3340,7 +3357,7 @@
         <p:spPr>
           <a:xfrm>
             <a:off x="2443779" y="2373536"/>
-            <a:ext cx="1654885" cy="292388"/>
+            <a:ext cx="1848522" cy="292388"/>
           </a:xfrm>
           <a:prstGeom prst="rect">
             <a:avLst/>
@@ -3357,7 +3374,11 @@
           <a:p>
             <a:r>
               <a:rPr lang="pt-BR" sz="1300" b="1" dirty="0" smtClean="0"/>
-              <a:t>Número Liquidação</a:t>
+              <a:t>Número da  </a:t>
+            </a:r>
+            <a:r>
+              <a:rPr lang="pt-BR" sz="1300" b="1" dirty="0" smtClean="0"/>
+              <a:t>Liquidação</a:t>
             </a:r>
             <a:endParaRPr lang="pt-BR" sz="1300" b="1" dirty="0"/>
           </a:p>
@@ -3379,7 +3400,7 @@
         </p:blipFill>
         <p:spPr>
           <a:xfrm>
-            <a:off x="3889114" y="2418274"/>
+            <a:off x="4199292" y="2393773"/>
             <a:ext cx="209550" cy="247650"/>
           </a:xfrm>
           <a:prstGeom prst="rect">
@@ -3403,7 +3424,7 @@
         </p:blipFill>
         <p:spPr>
           <a:xfrm>
-            <a:off x="1912285" y="2371404"/>
+            <a:off x="2088556" y="2371404"/>
             <a:ext cx="209550" cy="247650"/>
           </a:xfrm>
           <a:prstGeom prst="rect">
@@ -3520,7 +3541,7 @@
         <p:spPr>
           <a:xfrm>
             <a:off x="790072" y="2349035"/>
-            <a:ext cx="1333949" cy="292388"/>
+            <a:ext cx="1436761" cy="292388"/>
           </a:xfrm>
           <a:prstGeom prst="rect">
             <a:avLst/>
@@ -3537,7 +3558,11 @@
           <a:p>
             <a:r>
               <a:rPr lang="pt-BR" sz="1300" b="1" dirty="0" smtClean="0"/>
-              <a:t>Data Registro</a:t>
+              <a:t>Data </a:t>
+            </a:r>
+            <a:r>
+              <a:rPr lang="pt-BR" sz="1300" b="1" dirty="0" smtClean="0"/>
+              <a:t>de Registro</a:t>
             </a:r>
             <a:endParaRPr lang="pt-BR" sz="1300" b="1" dirty="0"/>
           </a:p>
@@ -3551,8 +3576,8 @@
         </p:nvSpPr>
         <p:spPr>
           <a:xfrm>
-            <a:off x="2443779" y="2373536"/>
-            <a:ext cx="1160033" cy="292388"/>
+            <a:off x="2377498" y="2393773"/>
+            <a:ext cx="2547769" cy="292388"/>
           </a:xfrm>
           <a:prstGeom prst="rect">
             <a:avLst/>
@@ -3569,7 +3594,7 @@
           <a:p>
             <a:r>
               <a:rPr lang="pt-BR" sz="1300" b="1" dirty="0" smtClean="0"/>
-              <a:t>Número OP</a:t>
+              <a:t>Número da Ordem de Pagamento</a:t>
             </a:r>
             <a:endParaRPr lang="pt-BR" sz="1300" b="1" dirty="0"/>
           </a:p>
@@ -3591,7 +3616,7 @@
         </p:blipFill>
         <p:spPr>
           <a:xfrm>
-            <a:off x="1912285" y="2371404"/>
+            <a:off x="2017283" y="2371404"/>
             <a:ext cx="209550" cy="247650"/>
           </a:xfrm>
           <a:prstGeom prst="rect">
@@ -3607,8 +3632,8 @@
         </p:nvSpPr>
         <p:spPr>
           <a:xfrm>
-            <a:off x="362174" y="1951773"/>
-            <a:ext cx="4163209" cy="1180652"/>
+            <a:off x="362174" y="1893346"/>
+            <a:ext cx="4909073" cy="1239079"/>
           </a:xfrm>
           <a:prstGeom prst="ellipse">
             <a:avLst/>
@@ -3645,6 +3670,30 @@
           </a:p>
         </p:txBody>
       </p:sp>
+      <p:pic>
+        <p:nvPicPr>
+          <p:cNvPr id="7" name="Imagem 6"/>
+          <p:cNvPicPr>
+            <a:picLocks noChangeAspect="1"/>
+          </p:cNvPicPr>
+          <p:nvPr/>
+        </p:nvPicPr>
+        <p:blipFill>
+          <a:blip r:embed="rId3"/>
+          <a:stretch>
+            <a:fillRect/>
+          </a:stretch>
+        </p:blipFill>
+        <p:spPr>
+          <a:xfrm>
+            <a:off x="4783932" y="2387737"/>
+            <a:ext cx="209550" cy="247650"/>
+          </a:xfrm>
+          <a:prstGeom prst="rect">
+            <a:avLst/>
+          </a:prstGeom>
+        </p:spPr>
+      </p:pic>
     </p:spTree>
     <p:extLst>
       <p:ext uri="{BB962C8B-B14F-4D97-AF65-F5344CB8AC3E}">
@@ -3842,7 +3891,7 @@
         <p:spPr>
           <a:xfrm>
             <a:off x="8928847" y="3001384"/>
-            <a:ext cx="2872292" cy="2308324"/>
+            <a:ext cx="2872292" cy="2123658"/>
           </a:xfrm>
           <a:prstGeom prst="rect">
             <a:avLst/>
@@ -3863,7 +3912,23 @@
                   <a:srgbClr val="FF0000"/>
                 </a:solidFill>
               </a:rPr>
-              <a:t>Valor financeiro repassado pelo concedente/órgão ou entidade estadual parceiro ao convenente / Organização da Sociedade Civil (OSC) parceria, referente ao(s) convênios(s)/ parceria(s) firmado(s) entre as partes por meio de pagamento via SIAFI. Abrange o valor do concedente / órgão ou entidade estadual parceiro, das emendas parlamentares e outras fontes. O efetivo pagamento pode estar pendente de assinatura do ordenador de despesa e/ou sujeito a compensação bancária.</a:t>
+              <a:t>Valor financeiro repassado pelo concedente/órgão ou entidade estadual parceiro ao convenente / Organização da Sociedade Civil (OSC) parceria, referente ao(s) convênios(s)/ parceria(s) firmado(s) entre as partes por meio de pagamento via SIAFI. Abrange o valor do concedente / órgão ou entidade estadual parceiro, das emendas parlamentares e outras fontes. O efetivo pagamento </a:t>
+            </a:r>
+            <a:r>
+              <a:rPr lang="pt-BR" sz="1200" dirty="0" smtClean="0">
+                <a:solidFill>
+                  <a:srgbClr val="FF0000"/>
+                </a:solidFill>
+              </a:rPr>
+              <a:t>esta sujeito </a:t>
+            </a:r>
+            <a:r>
+              <a:rPr lang="pt-BR" sz="1200" dirty="0" smtClean="0">
+                <a:solidFill>
+                  <a:srgbClr val="FF0000"/>
+                </a:solidFill>
+              </a:rPr>
+              <a:t>a compensação bancária.</a:t>
             </a:r>
             <a:endParaRPr lang="pt-BR" sz="1200" dirty="0">
               <a:solidFill>

</xml_diff>